<commit_message>
Update Slide 1 - Introduction.pptx
</commit_message>
<xml_diff>
--- a/Slide 1 - Introduction.pptx
+++ b/Slide 1 - Introduction.pptx
@@ -231,7 +231,6 @@
           </a:p>
         </c:rich>
       </c:tx>
-      <c:layout/>
       <c:overlay val="0"/>
       <c:spPr>
         <a:noFill/>
@@ -717,7 +716,6 @@
     </c:plotArea>
     <c:legend>
       <c:legendPos val="b"/>
-      <c:layout/>
       <c:overlay val="0"/>
       <c:spPr>
         <a:noFill/>
@@ -3701,6 +3699,13 @@
         </dgm:presLayoutVars>
       </dgm:prSet>
       <dgm:spPr/>
+      <dgm:t>
+        <a:bodyPr/>
+        <a:lstStyle/>
+        <a:p>
+          <a:endParaRPr lang="en-US"/>
+        </a:p>
+      </dgm:t>
     </dgm:pt>
     <dgm:pt modelId="{06FE7C65-8F30-427A-8238-631E74EDA2A2}" type="pres">
       <dgm:prSet presAssocID="{C7ACB7D7-F172-463E-B644-3265D53713E3}" presName="parentLin" presStyleCnt="0"/>
@@ -3709,6 +3714,13 @@
     <dgm:pt modelId="{5B285F88-5E67-4914-933E-58A693657725}" type="pres">
       <dgm:prSet presAssocID="{C7ACB7D7-F172-463E-B644-3265D53713E3}" presName="parentLeftMargin" presStyleLbl="node1" presStyleIdx="0" presStyleCnt="3"/>
       <dgm:spPr/>
+      <dgm:t>
+        <a:bodyPr/>
+        <a:lstStyle/>
+        <a:p>
+          <a:endParaRPr lang="en-US"/>
+        </a:p>
+      </dgm:t>
     </dgm:pt>
     <dgm:pt modelId="{51E95560-BF8B-46E5-B3BB-C7EF85DDD4DB}" type="pres">
       <dgm:prSet presAssocID="{C7ACB7D7-F172-463E-B644-3265D53713E3}" presName="parentText" presStyleLbl="node1" presStyleIdx="0" presStyleCnt="3">
@@ -3749,6 +3761,13 @@
     <dgm:pt modelId="{4026A807-B6B3-4A54-8687-9A3DF1077BCD}" type="pres">
       <dgm:prSet presAssocID="{2159A4EE-E47F-4703-85BB-A487BC1619A6}" presName="parentLeftMargin" presStyleLbl="node1" presStyleIdx="0" presStyleCnt="3"/>
       <dgm:spPr/>
+      <dgm:t>
+        <a:bodyPr/>
+        <a:lstStyle/>
+        <a:p>
+          <a:endParaRPr lang="en-US"/>
+        </a:p>
+      </dgm:t>
     </dgm:pt>
     <dgm:pt modelId="{223FA77C-4B79-4972-ADD9-372103FCA63D}" type="pres">
       <dgm:prSet presAssocID="{2159A4EE-E47F-4703-85BB-A487BC1619A6}" presName="parentText" presStyleLbl="node1" presStyleIdx="1" presStyleCnt="3">
@@ -3758,6 +3777,13 @@
         </dgm:presLayoutVars>
       </dgm:prSet>
       <dgm:spPr/>
+      <dgm:t>
+        <a:bodyPr/>
+        <a:lstStyle/>
+        <a:p>
+          <a:endParaRPr lang="en-US"/>
+        </a:p>
+      </dgm:t>
     </dgm:pt>
     <dgm:pt modelId="{844E5A36-7AAE-4C6B-AB97-AF12B1B241A9}" type="pres">
       <dgm:prSet presAssocID="{2159A4EE-E47F-4703-85BB-A487BC1619A6}" presName="negativeSpace" presStyleCnt="0"/>
@@ -3782,6 +3808,13 @@
     <dgm:pt modelId="{6D561339-31F2-4A3E-8E53-A6DA79C8AD6C}" type="pres">
       <dgm:prSet presAssocID="{5976A1D7-28B7-447A-B5EA-D8DD318ADCFA}" presName="parentLeftMargin" presStyleLbl="node1" presStyleIdx="1" presStyleCnt="3"/>
       <dgm:spPr/>
+      <dgm:t>
+        <a:bodyPr/>
+        <a:lstStyle/>
+        <a:p>
+          <a:endParaRPr lang="en-US"/>
+        </a:p>
+      </dgm:t>
     </dgm:pt>
     <dgm:pt modelId="{F147BF29-0378-4F04-97FC-96FB4F977503}" type="pres">
       <dgm:prSet presAssocID="{5976A1D7-28B7-447A-B5EA-D8DD318ADCFA}" presName="parentText" presStyleLbl="node1" presStyleIdx="2" presStyleCnt="3">
@@ -3791,6 +3824,13 @@
         </dgm:presLayoutVars>
       </dgm:prSet>
       <dgm:spPr/>
+      <dgm:t>
+        <a:bodyPr/>
+        <a:lstStyle/>
+        <a:p>
+          <a:endParaRPr lang="en-US"/>
+        </a:p>
+      </dgm:t>
     </dgm:pt>
     <dgm:pt modelId="{855FADA0-06B4-4FFB-880C-E2433B80FD7C}" type="pres">
       <dgm:prSet presAssocID="{5976A1D7-28B7-447A-B5EA-D8DD318ADCFA}" presName="negativeSpace" presStyleCnt="0"/>
@@ -3806,16 +3846,16 @@
     </dgm:pt>
   </dgm:ptLst>
   <dgm:cxnLst>
-    <dgm:cxn modelId="{8CB7ED47-028F-422E-8423-C0B72C7EBA69}" type="presOf" srcId="{C7ACB7D7-F172-463E-B644-3265D53713E3}" destId="{51E95560-BF8B-46E5-B3BB-C7EF85DDD4DB}" srcOrd="1" destOrd="0" presId="urn:microsoft.com/office/officeart/2005/8/layout/list1"/>
     <dgm:cxn modelId="{EEBB791B-05C8-4A64-B962-2849713D8752}" type="presOf" srcId="{7666A646-BE3F-4C75-8DB4-9C9130DCE744}" destId="{D76B1DE5-211C-4C2C-BE04-9E915C5DD3FE}" srcOrd="0" destOrd="0" presId="urn:microsoft.com/office/officeart/2005/8/layout/list1"/>
     <dgm:cxn modelId="{E8ED8BF9-41C4-4649-9D36-CA503CE00D00}" srcId="{7666A646-BE3F-4C75-8DB4-9C9130DCE744}" destId="{2159A4EE-E47F-4703-85BB-A487BC1619A6}" srcOrd="1" destOrd="0" parTransId="{D698ECAB-7711-4701-8740-515C81DB8634}" sibTransId="{48A7131A-10F3-4FDC-9233-E3181BB70D31}"/>
     <dgm:cxn modelId="{220BD619-31D1-4427-B296-48D4CC5AE9A6}" type="presOf" srcId="{5976A1D7-28B7-447A-B5EA-D8DD318ADCFA}" destId="{6D561339-31F2-4A3E-8E53-A6DA79C8AD6C}" srcOrd="0" destOrd="0" presId="urn:microsoft.com/office/officeart/2005/8/layout/list1"/>
     <dgm:cxn modelId="{B4A481F6-08ED-49E4-A36A-3666F4796BC9}" type="presOf" srcId="{2159A4EE-E47F-4703-85BB-A487BC1619A6}" destId="{4026A807-B6B3-4A54-8687-9A3DF1077BCD}" srcOrd="0" destOrd="0" presId="urn:microsoft.com/office/officeart/2005/8/layout/list1"/>
+    <dgm:cxn modelId="{8CB7ED47-028F-422E-8423-C0B72C7EBA69}" type="presOf" srcId="{C7ACB7D7-F172-463E-B644-3265D53713E3}" destId="{51E95560-BF8B-46E5-B3BB-C7EF85DDD4DB}" srcOrd="1" destOrd="0" presId="urn:microsoft.com/office/officeart/2005/8/layout/list1"/>
+    <dgm:cxn modelId="{D217BEBE-0B72-4AB8-9CC5-817D5CC3A29D}" type="presOf" srcId="{C7ACB7D7-F172-463E-B644-3265D53713E3}" destId="{5B285F88-5E67-4914-933E-58A693657725}" srcOrd="0" destOrd="0" presId="urn:microsoft.com/office/officeart/2005/8/layout/list1"/>
     <dgm:cxn modelId="{1A4212EA-5DD5-4111-8EED-CEC43EEC08F6}" type="presOf" srcId="{5976A1D7-28B7-447A-B5EA-D8DD318ADCFA}" destId="{F147BF29-0378-4F04-97FC-96FB4F977503}" srcOrd="1" destOrd="0" presId="urn:microsoft.com/office/officeart/2005/8/layout/list1"/>
+    <dgm:cxn modelId="{A6E0FECD-A885-45B4-AB45-AA4C149AF57F}" type="presOf" srcId="{2159A4EE-E47F-4703-85BB-A487BC1619A6}" destId="{223FA77C-4B79-4972-ADD9-372103FCA63D}" srcOrd="1" destOrd="0" presId="urn:microsoft.com/office/officeart/2005/8/layout/list1"/>
     <dgm:cxn modelId="{5A275831-64CF-4DDB-818D-8A3228C51295}" srcId="{7666A646-BE3F-4C75-8DB4-9C9130DCE744}" destId="{C7ACB7D7-F172-463E-B644-3265D53713E3}" srcOrd="0" destOrd="0" parTransId="{EBD7D602-15F8-4880-BD7D-5C753B695953}" sibTransId="{A2D3936D-1BBE-43F0-83BF-9E25E54B8506}"/>
-    <dgm:cxn modelId="{A6E0FECD-A885-45B4-AB45-AA4C149AF57F}" type="presOf" srcId="{2159A4EE-E47F-4703-85BB-A487BC1619A6}" destId="{223FA77C-4B79-4972-ADD9-372103FCA63D}" srcOrd="1" destOrd="0" presId="urn:microsoft.com/office/officeart/2005/8/layout/list1"/>
     <dgm:cxn modelId="{AF2B622D-6DA4-4054-A099-0B1302EC7543}" srcId="{7666A646-BE3F-4C75-8DB4-9C9130DCE744}" destId="{5976A1D7-28B7-447A-B5EA-D8DD318ADCFA}" srcOrd="2" destOrd="0" parTransId="{2B6C8958-3C9D-42B6-8DAF-B542F1A9D224}" sibTransId="{C062CD8E-307D-4652-8C21-67A85C05DAFB}"/>
-    <dgm:cxn modelId="{D217BEBE-0B72-4AB8-9CC5-817D5CC3A29D}" type="presOf" srcId="{C7ACB7D7-F172-463E-B644-3265D53713E3}" destId="{5B285F88-5E67-4914-933E-58A693657725}" srcOrd="0" destOrd="0" presId="urn:microsoft.com/office/officeart/2005/8/layout/list1"/>
     <dgm:cxn modelId="{8BEBF671-213B-4565-8F2F-46710AD54DD0}" type="presParOf" srcId="{D76B1DE5-211C-4C2C-BE04-9E915C5DD3FE}" destId="{06FE7C65-8F30-427A-8238-631E74EDA2A2}" srcOrd="0" destOrd="0" presId="urn:microsoft.com/office/officeart/2005/8/layout/list1"/>
     <dgm:cxn modelId="{3537A7E7-FB05-4CB9-9B22-1A2C31A3A5B8}" type="presParOf" srcId="{06FE7C65-8F30-427A-8238-631E74EDA2A2}" destId="{5B285F88-5E67-4914-933E-58A693657725}" srcOrd="0" destOrd="0" presId="urn:microsoft.com/office/officeart/2005/8/layout/list1"/>
     <dgm:cxn modelId="{3000FDF0-84CA-4C62-B351-A0DE0FB4524E}" type="presParOf" srcId="{06FE7C65-8F30-427A-8238-631E74EDA2A2}" destId="{51E95560-BF8B-46E5-B3BB-C7EF85DDD4DB}" srcOrd="1" destOrd="0" presId="urn:microsoft.com/office/officeart/2005/8/layout/list1"/>
@@ -4019,6 +4059,13 @@
         </dgm:presLayoutVars>
       </dgm:prSet>
       <dgm:spPr/>
+      <dgm:t>
+        <a:bodyPr/>
+        <a:lstStyle/>
+        <a:p>
+          <a:endParaRPr lang="en-US"/>
+        </a:p>
+      </dgm:t>
     </dgm:pt>
     <dgm:pt modelId="{06FE7C65-8F30-427A-8238-631E74EDA2A2}" type="pres">
       <dgm:prSet presAssocID="{C7ACB7D7-F172-463E-B644-3265D53713E3}" presName="parentLin" presStyleCnt="0"/>
@@ -4027,6 +4074,13 @@
     <dgm:pt modelId="{5B285F88-5E67-4914-933E-58A693657725}" type="pres">
       <dgm:prSet presAssocID="{C7ACB7D7-F172-463E-B644-3265D53713E3}" presName="parentLeftMargin" presStyleLbl="node1" presStyleIdx="0" presStyleCnt="4"/>
       <dgm:spPr/>
+      <dgm:t>
+        <a:bodyPr/>
+        <a:lstStyle/>
+        <a:p>
+          <a:endParaRPr lang="en-US"/>
+        </a:p>
+      </dgm:t>
     </dgm:pt>
     <dgm:pt modelId="{51E95560-BF8B-46E5-B3BB-C7EF85DDD4DB}" type="pres">
       <dgm:prSet presAssocID="{C7ACB7D7-F172-463E-B644-3265D53713E3}" presName="parentText" presStyleLbl="node1" presStyleIdx="0" presStyleCnt="4">
@@ -4067,6 +4121,13 @@
     <dgm:pt modelId="{4026A807-B6B3-4A54-8687-9A3DF1077BCD}" type="pres">
       <dgm:prSet presAssocID="{2159A4EE-E47F-4703-85BB-A487BC1619A6}" presName="parentLeftMargin" presStyleLbl="node1" presStyleIdx="0" presStyleCnt="4"/>
       <dgm:spPr/>
+      <dgm:t>
+        <a:bodyPr/>
+        <a:lstStyle/>
+        <a:p>
+          <a:endParaRPr lang="en-US"/>
+        </a:p>
+      </dgm:t>
     </dgm:pt>
     <dgm:pt modelId="{223FA77C-4B79-4972-ADD9-372103FCA63D}" type="pres">
       <dgm:prSet presAssocID="{2159A4EE-E47F-4703-85BB-A487BC1619A6}" presName="parentText" presStyleLbl="node1" presStyleIdx="1" presStyleCnt="4">
@@ -4107,6 +4168,13 @@
     <dgm:pt modelId="{6D561339-31F2-4A3E-8E53-A6DA79C8AD6C}" type="pres">
       <dgm:prSet presAssocID="{5976A1D7-28B7-447A-B5EA-D8DD318ADCFA}" presName="parentLeftMargin" presStyleLbl="node1" presStyleIdx="1" presStyleCnt="4"/>
       <dgm:spPr/>
+      <dgm:t>
+        <a:bodyPr/>
+        <a:lstStyle/>
+        <a:p>
+          <a:endParaRPr lang="en-US"/>
+        </a:p>
+      </dgm:t>
     </dgm:pt>
     <dgm:pt modelId="{F147BF29-0378-4F04-97FC-96FB4F977503}" type="pres">
       <dgm:prSet presAssocID="{5976A1D7-28B7-447A-B5EA-D8DD318ADCFA}" presName="parentText" presStyleLbl="node1" presStyleIdx="2" presStyleCnt="4">
@@ -4116,6 +4184,13 @@
         </dgm:presLayoutVars>
       </dgm:prSet>
       <dgm:spPr/>
+      <dgm:t>
+        <a:bodyPr/>
+        <a:lstStyle/>
+        <a:p>
+          <a:endParaRPr lang="en-US"/>
+        </a:p>
+      </dgm:t>
     </dgm:pt>
     <dgm:pt modelId="{855FADA0-06B4-4FFB-880C-E2433B80FD7C}" type="pres">
       <dgm:prSet presAssocID="{5976A1D7-28B7-447A-B5EA-D8DD318ADCFA}" presName="negativeSpace" presStyleCnt="0"/>
@@ -4140,6 +4215,13 @@
     <dgm:pt modelId="{B290DF77-D09C-483A-BDBD-39BEB51466AB}" type="pres">
       <dgm:prSet presAssocID="{A72E7A0A-60AD-41F8-889E-E86ABAB79938}" presName="parentLeftMargin" presStyleLbl="node1" presStyleIdx="2" presStyleCnt="4"/>
       <dgm:spPr/>
+      <dgm:t>
+        <a:bodyPr/>
+        <a:lstStyle/>
+        <a:p>
+          <a:endParaRPr lang="en-US"/>
+        </a:p>
+      </dgm:t>
     </dgm:pt>
     <dgm:pt modelId="{EFF9B757-755E-4972-B53D-74B7F90F89F4}" type="pres">
       <dgm:prSet presAssocID="{A72E7A0A-60AD-41F8-889E-E86ABAB79938}" presName="parentText" presStyleLbl="node1" presStyleIdx="3" presStyleCnt="4">
@@ -4149,6 +4231,13 @@
         </dgm:presLayoutVars>
       </dgm:prSet>
       <dgm:spPr/>
+      <dgm:t>
+        <a:bodyPr/>
+        <a:lstStyle/>
+        <a:p>
+          <a:endParaRPr lang="en-US"/>
+        </a:p>
+      </dgm:t>
     </dgm:pt>
     <dgm:pt modelId="{3F13B403-4345-468B-A10F-41B73945980B}" type="pres">
       <dgm:prSet presAssocID="{A72E7A0A-60AD-41F8-889E-E86ABAB79938}" presName="negativeSpace" presStyleCnt="0"/>
@@ -4164,19 +4253,19 @@
     </dgm:pt>
   </dgm:ptLst>
   <dgm:cxnLst>
-    <dgm:cxn modelId="{8CB7ED47-028F-422E-8423-C0B72C7EBA69}" type="presOf" srcId="{C7ACB7D7-F172-463E-B644-3265D53713E3}" destId="{51E95560-BF8B-46E5-B3BB-C7EF85DDD4DB}" srcOrd="1" destOrd="0" presId="urn:microsoft.com/office/officeart/2005/8/layout/list1"/>
     <dgm:cxn modelId="{EEBB791B-05C8-4A64-B962-2849713D8752}" type="presOf" srcId="{7666A646-BE3F-4C75-8DB4-9C9130DCE744}" destId="{D76B1DE5-211C-4C2C-BE04-9E915C5DD3FE}" srcOrd="0" destOrd="0" presId="urn:microsoft.com/office/officeart/2005/8/layout/list1"/>
-    <dgm:cxn modelId="{FFC28CD1-5778-4066-AD41-C43E7FF00B7F}" type="presOf" srcId="{A72E7A0A-60AD-41F8-889E-E86ABAB79938}" destId="{B290DF77-D09C-483A-BDBD-39BEB51466AB}" srcOrd="0" destOrd="0" presId="urn:microsoft.com/office/officeart/2005/8/layout/list1"/>
     <dgm:cxn modelId="{E8ED8BF9-41C4-4649-9D36-CA503CE00D00}" srcId="{7666A646-BE3F-4C75-8DB4-9C9130DCE744}" destId="{2159A4EE-E47F-4703-85BB-A487BC1619A6}" srcOrd="1" destOrd="0" parTransId="{D698ECAB-7711-4701-8740-515C81DB8634}" sibTransId="{48A7131A-10F3-4FDC-9233-E3181BB70D31}"/>
     <dgm:cxn modelId="{220BD619-31D1-4427-B296-48D4CC5AE9A6}" type="presOf" srcId="{5976A1D7-28B7-447A-B5EA-D8DD318ADCFA}" destId="{6D561339-31F2-4A3E-8E53-A6DA79C8AD6C}" srcOrd="0" destOrd="0" presId="urn:microsoft.com/office/officeart/2005/8/layout/list1"/>
+    <dgm:cxn modelId="{92725A5E-E345-4FB4-8439-2727B0513FD2}" type="presOf" srcId="{A72E7A0A-60AD-41F8-889E-E86ABAB79938}" destId="{EFF9B757-755E-4972-B53D-74B7F90F89F4}" srcOrd="1" destOrd="0" presId="urn:microsoft.com/office/officeart/2005/8/layout/list1"/>
+    <dgm:cxn modelId="{B4A481F6-08ED-49E4-A36A-3666F4796BC9}" type="presOf" srcId="{2159A4EE-E47F-4703-85BB-A487BC1619A6}" destId="{4026A807-B6B3-4A54-8687-9A3DF1077BCD}" srcOrd="0" destOrd="0" presId="urn:microsoft.com/office/officeart/2005/8/layout/list1"/>
+    <dgm:cxn modelId="{8CB7ED47-028F-422E-8423-C0B72C7EBA69}" type="presOf" srcId="{C7ACB7D7-F172-463E-B644-3265D53713E3}" destId="{51E95560-BF8B-46E5-B3BB-C7EF85DDD4DB}" srcOrd="1" destOrd="0" presId="urn:microsoft.com/office/officeart/2005/8/layout/list1"/>
+    <dgm:cxn modelId="{D217BEBE-0B72-4AB8-9CC5-817D5CC3A29D}" type="presOf" srcId="{C7ACB7D7-F172-463E-B644-3265D53713E3}" destId="{5B285F88-5E67-4914-933E-58A693657725}" srcOrd="0" destOrd="0" presId="urn:microsoft.com/office/officeart/2005/8/layout/list1"/>
     <dgm:cxn modelId="{01CF829D-EA0B-4282-B7FC-43B4DC3E83CD}" srcId="{7666A646-BE3F-4C75-8DB4-9C9130DCE744}" destId="{A72E7A0A-60AD-41F8-889E-E86ABAB79938}" srcOrd="3" destOrd="0" parTransId="{4B640C5B-C3B1-4F93-A9F3-F931FF93C436}" sibTransId="{A1BD6E4B-3B8E-4657-AD66-B626CBE977DB}"/>
-    <dgm:cxn modelId="{B4A481F6-08ED-49E4-A36A-3666F4796BC9}" type="presOf" srcId="{2159A4EE-E47F-4703-85BB-A487BC1619A6}" destId="{4026A807-B6B3-4A54-8687-9A3DF1077BCD}" srcOrd="0" destOrd="0" presId="urn:microsoft.com/office/officeart/2005/8/layout/list1"/>
-    <dgm:cxn modelId="{92725A5E-E345-4FB4-8439-2727B0513FD2}" type="presOf" srcId="{A72E7A0A-60AD-41F8-889E-E86ABAB79938}" destId="{EFF9B757-755E-4972-B53D-74B7F90F89F4}" srcOrd="1" destOrd="0" presId="urn:microsoft.com/office/officeart/2005/8/layout/list1"/>
     <dgm:cxn modelId="{1A4212EA-5DD5-4111-8EED-CEC43EEC08F6}" type="presOf" srcId="{5976A1D7-28B7-447A-B5EA-D8DD318ADCFA}" destId="{F147BF29-0378-4F04-97FC-96FB4F977503}" srcOrd="1" destOrd="0" presId="urn:microsoft.com/office/officeart/2005/8/layout/list1"/>
+    <dgm:cxn modelId="{A6E0FECD-A885-45B4-AB45-AA4C149AF57F}" type="presOf" srcId="{2159A4EE-E47F-4703-85BB-A487BC1619A6}" destId="{223FA77C-4B79-4972-ADD9-372103FCA63D}" srcOrd="1" destOrd="0" presId="urn:microsoft.com/office/officeart/2005/8/layout/list1"/>
     <dgm:cxn modelId="{5A275831-64CF-4DDB-818D-8A3228C51295}" srcId="{7666A646-BE3F-4C75-8DB4-9C9130DCE744}" destId="{C7ACB7D7-F172-463E-B644-3265D53713E3}" srcOrd="0" destOrd="0" parTransId="{EBD7D602-15F8-4880-BD7D-5C753B695953}" sibTransId="{A2D3936D-1BBE-43F0-83BF-9E25E54B8506}"/>
-    <dgm:cxn modelId="{A6E0FECD-A885-45B4-AB45-AA4C149AF57F}" type="presOf" srcId="{2159A4EE-E47F-4703-85BB-A487BC1619A6}" destId="{223FA77C-4B79-4972-ADD9-372103FCA63D}" srcOrd="1" destOrd="0" presId="urn:microsoft.com/office/officeart/2005/8/layout/list1"/>
     <dgm:cxn modelId="{AF2B622D-6DA4-4054-A099-0B1302EC7543}" srcId="{7666A646-BE3F-4C75-8DB4-9C9130DCE744}" destId="{5976A1D7-28B7-447A-B5EA-D8DD318ADCFA}" srcOrd="2" destOrd="0" parTransId="{2B6C8958-3C9D-42B6-8DAF-B542F1A9D224}" sibTransId="{C062CD8E-307D-4652-8C21-67A85C05DAFB}"/>
-    <dgm:cxn modelId="{D217BEBE-0B72-4AB8-9CC5-817D5CC3A29D}" type="presOf" srcId="{C7ACB7D7-F172-463E-B644-3265D53713E3}" destId="{5B285F88-5E67-4914-933E-58A693657725}" srcOrd="0" destOrd="0" presId="urn:microsoft.com/office/officeart/2005/8/layout/list1"/>
+    <dgm:cxn modelId="{FFC28CD1-5778-4066-AD41-C43E7FF00B7F}" type="presOf" srcId="{A72E7A0A-60AD-41F8-889E-E86ABAB79938}" destId="{B290DF77-D09C-483A-BDBD-39BEB51466AB}" srcOrd="0" destOrd="0" presId="urn:microsoft.com/office/officeart/2005/8/layout/list1"/>
     <dgm:cxn modelId="{8BEBF671-213B-4565-8F2F-46710AD54DD0}" type="presParOf" srcId="{D76B1DE5-211C-4C2C-BE04-9E915C5DD3FE}" destId="{06FE7C65-8F30-427A-8238-631E74EDA2A2}" srcOrd="0" destOrd="0" presId="urn:microsoft.com/office/officeart/2005/8/layout/list1"/>
     <dgm:cxn modelId="{3537A7E7-FB05-4CB9-9B22-1A2C31A3A5B8}" type="presParOf" srcId="{06FE7C65-8F30-427A-8238-631E74EDA2A2}" destId="{5B285F88-5E67-4914-933E-58A693657725}" srcOrd="0" destOrd="0" presId="urn:microsoft.com/office/officeart/2005/8/layout/list1"/>
     <dgm:cxn modelId="{3000FDF0-84CA-4C62-B351-A0DE0FB4524E}" type="presParOf" srcId="{06FE7C65-8F30-427A-8238-631E74EDA2A2}" destId="{51E95560-BF8B-46E5-B3BB-C7EF85DDD4DB}" srcOrd="1" destOrd="0" presId="urn:microsoft.com/office/officeart/2005/8/layout/list1"/>
@@ -4309,6 +4398,13 @@
         </dgm:presLayoutVars>
       </dgm:prSet>
       <dgm:spPr/>
+      <dgm:t>
+        <a:bodyPr/>
+        <a:lstStyle/>
+        <a:p>
+          <a:endParaRPr lang="en-US"/>
+        </a:p>
+      </dgm:t>
     </dgm:pt>
     <dgm:pt modelId="{06FE7C65-8F30-427A-8238-631E74EDA2A2}" type="pres">
       <dgm:prSet presAssocID="{C7ACB7D7-F172-463E-B644-3265D53713E3}" presName="parentLin" presStyleCnt="0"/>
@@ -4317,6 +4413,13 @@
     <dgm:pt modelId="{5B285F88-5E67-4914-933E-58A693657725}" type="pres">
       <dgm:prSet presAssocID="{C7ACB7D7-F172-463E-B644-3265D53713E3}" presName="parentLeftMargin" presStyleLbl="node1" presStyleIdx="0" presStyleCnt="2"/>
       <dgm:spPr/>
+      <dgm:t>
+        <a:bodyPr/>
+        <a:lstStyle/>
+        <a:p>
+          <a:endParaRPr lang="en-US"/>
+        </a:p>
+      </dgm:t>
     </dgm:pt>
     <dgm:pt modelId="{51E95560-BF8B-46E5-B3BB-C7EF85DDD4DB}" type="pres">
       <dgm:prSet presAssocID="{C7ACB7D7-F172-463E-B644-3265D53713E3}" presName="parentText" presStyleLbl="node1" presStyleIdx="0" presStyleCnt="2">
@@ -4357,6 +4460,13 @@
     <dgm:pt modelId="{99435D91-8C7D-4DED-B3A0-067EF215DE7C}" type="pres">
       <dgm:prSet presAssocID="{172A8951-F772-4AD3-91EE-91B91F603264}" presName="parentLeftMargin" presStyleLbl="node1" presStyleIdx="0" presStyleCnt="2"/>
       <dgm:spPr/>
+      <dgm:t>
+        <a:bodyPr/>
+        <a:lstStyle/>
+        <a:p>
+          <a:endParaRPr lang="en-US"/>
+        </a:p>
+      </dgm:t>
     </dgm:pt>
     <dgm:pt modelId="{B3581F09-F972-4C6E-8E75-2323605BE924}" type="pres">
       <dgm:prSet presAssocID="{172A8951-F772-4AD3-91EE-91B91F603264}" presName="parentText" presStyleLbl="node1" presStyleIdx="1" presStyleCnt="2">
@@ -4388,12 +4498,12 @@
     </dgm:pt>
   </dgm:ptLst>
   <dgm:cxnLst>
+    <dgm:cxn modelId="{EEBB791B-05C8-4A64-B962-2849713D8752}" type="presOf" srcId="{7666A646-BE3F-4C75-8DB4-9C9130DCE744}" destId="{D76B1DE5-211C-4C2C-BE04-9E915C5DD3FE}" srcOrd="0" destOrd="0" presId="urn:microsoft.com/office/officeart/2005/8/layout/list1"/>
+    <dgm:cxn modelId="{036EBD9A-9BB9-4D26-B5F4-1A521CC1E5BD}" srcId="{7666A646-BE3F-4C75-8DB4-9C9130DCE744}" destId="{172A8951-F772-4AD3-91EE-91B91F603264}" srcOrd="1" destOrd="0" parTransId="{EAA2A6BA-3788-4239-A2AA-F6C561E331CB}" sibTransId="{9636B0B3-30E5-4822-A6B1-5BC7A12461B6}"/>
+    <dgm:cxn modelId="{359E9F87-2531-4DC0-B38F-2CAC948C9FD5}" type="presOf" srcId="{172A8951-F772-4AD3-91EE-91B91F603264}" destId="{B3581F09-F972-4C6E-8E75-2323605BE924}" srcOrd="1" destOrd="0" presId="urn:microsoft.com/office/officeart/2005/8/layout/list1"/>
+    <dgm:cxn modelId="{8CB7ED47-028F-422E-8423-C0B72C7EBA69}" type="presOf" srcId="{C7ACB7D7-F172-463E-B644-3265D53713E3}" destId="{51E95560-BF8B-46E5-B3BB-C7EF85DDD4DB}" srcOrd="1" destOrd="0" presId="urn:microsoft.com/office/officeart/2005/8/layout/list1"/>
+    <dgm:cxn modelId="{D217BEBE-0B72-4AB8-9CC5-817D5CC3A29D}" type="presOf" srcId="{C7ACB7D7-F172-463E-B644-3265D53713E3}" destId="{5B285F88-5E67-4914-933E-58A693657725}" srcOrd="0" destOrd="0" presId="urn:microsoft.com/office/officeart/2005/8/layout/list1"/>
     <dgm:cxn modelId="{5A275831-64CF-4DDB-818D-8A3228C51295}" srcId="{7666A646-BE3F-4C75-8DB4-9C9130DCE744}" destId="{C7ACB7D7-F172-463E-B644-3265D53713E3}" srcOrd="0" destOrd="0" parTransId="{EBD7D602-15F8-4880-BD7D-5C753B695953}" sibTransId="{A2D3936D-1BBE-43F0-83BF-9E25E54B8506}"/>
-    <dgm:cxn modelId="{EEBB791B-05C8-4A64-B962-2849713D8752}" type="presOf" srcId="{7666A646-BE3F-4C75-8DB4-9C9130DCE744}" destId="{D76B1DE5-211C-4C2C-BE04-9E915C5DD3FE}" srcOrd="0" destOrd="0" presId="urn:microsoft.com/office/officeart/2005/8/layout/list1"/>
-    <dgm:cxn modelId="{D217BEBE-0B72-4AB8-9CC5-817D5CC3A29D}" type="presOf" srcId="{C7ACB7D7-F172-463E-B644-3265D53713E3}" destId="{5B285F88-5E67-4914-933E-58A693657725}" srcOrd="0" destOrd="0" presId="urn:microsoft.com/office/officeart/2005/8/layout/list1"/>
-    <dgm:cxn modelId="{359E9F87-2531-4DC0-B38F-2CAC948C9FD5}" type="presOf" srcId="{172A8951-F772-4AD3-91EE-91B91F603264}" destId="{B3581F09-F972-4C6E-8E75-2323605BE924}" srcOrd="1" destOrd="0" presId="urn:microsoft.com/office/officeart/2005/8/layout/list1"/>
-    <dgm:cxn modelId="{036EBD9A-9BB9-4D26-B5F4-1A521CC1E5BD}" srcId="{7666A646-BE3F-4C75-8DB4-9C9130DCE744}" destId="{172A8951-F772-4AD3-91EE-91B91F603264}" srcOrd="1" destOrd="0" parTransId="{EAA2A6BA-3788-4239-A2AA-F6C561E331CB}" sibTransId="{9636B0B3-30E5-4822-A6B1-5BC7A12461B6}"/>
-    <dgm:cxn modelId="{8CB7ED47-028F-422E-8423-C0B72C7EBA69}" type="presOf" srcId="{C7ACB7D7-F172-463E-B644-3265D53713E3}" destId="{51E95560-BF8B-46E5-B3BB-C7EF85DDD4DB}" srcOrd="1" destOrd="0" presId="urn:microsoft.com/office/officeart/2005/8/layout/list1"/>
     <dgm:cxn modelId="{407CA934-8309-47AB-9C89-16E075B8E5D9}" type="presOf" srcId="{172A8951-F772-4AD3-91EE-91B91F603264}" destId="{99435D91-8C7D-4DED-B3A0-067EF215DE7C}" srcOrd="0" destOrd="0" presId="urn:microsoft.com/office/officeart/2005/8/layout/list1"/>
     <dgm:cxn modelId="{8BEBF671-213B-4565-8F2F-46710AD54DD0}" type="presParOf" srcId="{D76B1DE5-211C-4C2C-BE04-9E915C5DD3FE}" destId="{06FE7C65-8F30-427A-8238-631E74EDA2A2}" srcOrd="0" destOrd="0" presId="urn:microsoft.com/office/officeart/2005/8/layout/list1"/>
     <dgm:cxn modelId="{3537A7E7-FB05-4CB9-9B22-1A2C31A3A5B8}" type="presParOf" srcId="{06FE7C65-8F30-427A-8238-631E74EDA2A2}" destId="{5B285F88-5E67-4914-933E-58A693657725}" srcOrd="0" destOrd="0" presId="urn:microsoft.com/office/officeart/2005/8/layout/list1"/>
@@ -9467,7 +9577,7 @@
           <a:p>
             <a:fld id="{872BFC85-49E4-447A-A7E3-16153CB2FE2A}" type="datetimeFigureOut">
               <a:rPr lang="en-US" smtClean="0"/>
-              <a:t>28-Aug-21</a:t>
+              <a:t>01-Sep-21</a:t>
             </a:fld>
             <a:endParaRPr lang="en-US" dirty="0"/>
           </a:p>
@@ -9644,7 +9754,7 @@
           <a:p>
             <a:fld id="{1071B50E-4C60-4F9E-B773-52059170945B}" type="datetimeFigureOut">
               <a:rPr lang="en-US" noProof="0" smtClean="0"/>
-              <a:t>28-Aug-21</a:t>
+              <a:t>01-Sep-21</a:t>
             </a:fld>
             <a:endParaRPr lang="en-US" noProof="0" dirty="0"/>
           </a:p>
@@ -22456,7 +22566,7 @@
         </p:nvSpPr>
         <p:spPr>
           <a:xfrm>
-            <a:off x="8425257" y="5838284"/>
+            <a:off x="8103671" y="5990684"/>
             <a:ext cx="3196644" cy="369332"/>
           </a:xfrm>
           <a:prstGeom prst="rect">
@@ -22481,6 +22591,36 @@
             <a:r>
               <a:rPr lang="en-US" dirty="0" smtClean="0"/>
               <a:t>- MYSQL</a:t>
+            </a:r>
+            <a:endParaRPr lang="en-US" dirty="0"/>
+          </a:p>
+        </p:txBody>
+      </p:sp>
+      <p:sp>
+        <p:nvSpPr>
+          <p:cNvPr id="9" name="TextBox 8"/>
+          <p:cNvSpPr txBox="1"/>
+          <p:nvPr/>
+        </p:nvSpPr>
+        <p:spPr>
+          <a:xfrm>
+            <a:off x="1092011" y="5990684"/>
+            <a:ext cx="2324547" cy="369332"/>
+          </a:xfrm>
+          <a:prstGeom prst="rect">
+            <a:avLst/>
+          </a:prstGeom>
+          <a:noFill/>
+        </p:spPr>
+        <p:txBody>
+          <a:bodyPr wrap="none" rtlCol="0">
+            <a:spAutoFit/>
+          </a:bodyPr>
+          <a:lstStyle/>
+          <a:p>
+            <a:r>
+              <a:rPr lang="en-US" dirty="0" smtClean="0"/>
+              <a:t>BAB I : INTRODUCTION</a:t>
             </a:r>
             <a:endParaRPr lang="en-US" dirty="0"/>
           </a:p>
@@ -30107,7 +30247,6 @@
               <a:rPr lang="en-US" dirty="0"/>
               <a:t> – CSS</a:t>
             </a:r>
-            <a:endParaRPr lang="en-US" dirty="0"/>
           </a:p>
         </p:txBody>
       </p:sp>
@@ -30990,7 +31129,6 @@
               <a:rPr lang="en-US" dirty="0"/>
               <a:t> – CSS</a:t>
             </a:r>
-            <a:endParaRPr lang="en-US" dirty="0"/>
           </a:p>
         </p:txBody>
       </p:sp>
@@ -32184,7 +32322,6 @@
               <a:rPr lang="en-US" dirty="0"/>
               <a:t> HTML.</a:t>
             </a:r>
-            <a:endParaRPr lang="en-US" dirty="0"/>
           </a:p>
         </p:txBody>
       </p:sp>
@@ -32573,7 +32710,6 @@
               <a:rPr lang="en-US" dirty="0"/>
               <a:t> – CSS</a:t>
             </a:r>
-            <a:endParaRPr lang="en-US" dirty="0"/>
           </a:p>
         </p:txBody>
       </p:sp>
@@ -32920,7 +33056,6 @@
               <a:rPr lang="en-US" sz="1200" b="1" spc="0" dirty="0"/>
               <a:t>&lt;/head&gt;</a:t>
             </a:r>
-            <a:endParaRPr lang="en-US" sz="1200" b="1" spc="0" dirty="0"/>
           </a:p>
         </p:txBody>
       </p:sp>
@@ -33365,7 +33500,6 @@
               <a:rPr lang="en-US" dirty="0"/>
               <a:t> – CSS</a:t>
             </a:r>
-            <a:endParaRPr lang="en-US" dirty="0"/>
           </a:p>
         </p:txBody>
       </p:sp>
@@ -34395,7 +34529,6 @@
               <a:rPr lang="en-US" b="0" dirty="0"/>
               <a:t>?</a:t>
             </a:r>
-            <a:endParaRPr lang="en-US" b="0" dirty="0"/>
           </a:p>
         </p:txBody>
       </p:sp>
@@ -36133,7 +36266,6 @@
               <a:rPr lang="en-US" b="0" dirty="0"/>
               <a:t> PHP ?</a:t>
             </a:r>
-            <a:endParaRPr lang="en-US" b="0" dirty="0"/>
           </a:p>
         </p:txBody>
       </p:sp>
@@ -36605,7 +36737,6 @@
               <a:rPr lang="en-US" dirty="0"/>
               <a:t> server.</a:t>
             </a:r>
-            <a:endParaRPr lang="en-US" dirty="0"/>
           </a:p>
         </p:txBody>
       </p:sp>
@@ -36679,13 +36810,8 @@
             </a:r>
             <a:r>
               <a:rPr lang="en-US" dirty="0"/>
-              <a:t> – </a:t>
-            </a:r>
-            <a:r>
-              <a:rPr lang="en-US" dirty="0"/>
-              <a:t>PHP</a:t>
-            </a:r>
-            <a:endParaRPr lang="en-US" dirty="0"/>
+              <a:t> – PHP</a:t>
+            </a:r>
           </a:p>
         </p:txBody>
       </p:sp>
@@ -38274,11 +38400,6 @@
               </a:rPr>
               <a:t>?&gt;</a:t>
             </a:r>
-            <a:endParaRPr lang="en-US" dirty="0">
-              <a:solidFill>
-                <a:srgbClr val="FF0000"/>
-              </a:solidFill>
-            </a:endParaRPr>
           </a:p>
         </p:txBody>
       </p:sp>
@@ -38513,7 +38634,6 @@
               <a:rPr lang="en-US" dirty="0"/>
               <a:t> echo "Hello World"; ?&gt;</a:t>
             </a:r>
-            <a:endParaRPr lang="en-US" dirty="0"/>
           </a:p>
         </p:txBody>
       </p:sp>
@@ -40432,7 +40552,6 @@
               <a:rPr lang="en-US" sz="1600" dirty="0"/>
               <a:t>&lt;/html&gt;</a:t>
             </a:r>
-            <a:endParaRPr lang="en-US" sz="1600" dirty="0"/>
           </a:p>
         </p:txBody>
       </p:sp>
@@ -41251,7 +41370,6 @@
               <a:rPr lang="en-US" sz="1200" dirty="0"/>
               <a:t>&lt;/html&gt; </a:t>
             </a:r>
-            <a:endParaRPr lang="en-US" sz="1200" dirty="0"/>
           </a:p>
         </p:txBody>
       </p:sp>
@@ -43709,7 +43827,6 @@
               <a:rPr lang="en-US" sz="1050" spc="0" dirty="0"/>
               <a:t>&lt;/html&gt;</a:t>
             </a:r>
-            <a:endParaRPr lang="en-US" sz="1050" spc="0" dirty="0"/>
           </a:p>
         </p:txBody>
       </p:sp>
@@ -45842,27 +45959,19 @@
               <a:t> </a:t>
             </a:r>
             <a:r>
-              <a:rPr lang="en-US" dirty="0" err="1"/>
-              <a:t>dan</a:t>
-            </a:r>
-            <a:r>
-              <a:rPr lang="en-US" dirty="0"/>
-              <a:t> </a:t>
-            </a:r>
-            <a:r>
-              <a:rPr lang="en-US" dirty="0" err="1"/>
-              <a:t>adanya</a:t>
-            </a:r>
-            <a:r>
-              <a:rPr lang="en-US" dirty="0"/>
-              <a:t> framework </a:t>
-            </a:r>
-            <a:r>
-              <a:rPr lang="en-US" dirty="0" err="1"/>
+              <a:rPr lang="en-US" dirty="0" err="1" smtClean="0"/>
+              <a:t>terutama</a:t>
+            </a:r>
+            <a:r>
+              <a:rPr lang="en-US" dirty="0" smtClean="0"/>
+              <a:t> </a:t>
+            </a:r>
+            <a:r>
+              <a:rPr lang="en-US" dirty="0" err="1" smtClean="0"/>
               <a:t>untuk</a:t>
             </a:r>
             <a:r>
-              <a:rPr lang="en-US" dirty="0"/>
+              <a:rPr lang="en-US" dirty="0" smtClean="0"/>
               <a:t> </a:t>
             </a:r>
             <a:r>
@@ -45890,19 +45999,11 @@
               <a:t> </a:t>
             </a:r>
             <a:r>
-              <a:rPr lang="en-US" dirty="0" err="1"/>
-              <a:t>bisa</a:t>
-            </a:r>
-            <a:r>
-              <a:rPr lang="en-US" dirty="0"/>
-              <a:t> </a:t>
-            </a:r>
-            <a:r>
-              <a:rPr lang="en-US" dirty="0" err="1"/>
+              <a:rPr lang="en-US" dirty="0" err="1" smtClean="0"/>
               <a:t>bersama</a:t>
             </a:r>
             <a:r>
-              <a:rPr lang="en-US" dirty="0"/>
+              <a:rPr lang="en-US" dirty="0" smtClean="0"/>
               <a:t> </a:t>
             </a:r>
             <a:r>
@@ -47648,15 +47749,7 @@
             </a:r>
             <a:r>
               <a:rPr lang="en-US" b="0" i="1" dirty="0" smtClean="0"/>
-              <a:t>Sublime, </a:t>
-            </a:r>
-            <a:r>
-              <a:rPr lang="en-US" b="0" i="1" dirty="0" err="1" smtClean="0"/>
-              <a:t>VsCode</a:t>
-            </a:r>
-            <a:r>
-              <a:rPr lang="en-US" b="0" i="1" dirty="0" smtClean="0"/>
-              <a:t>)</a:t>
+              <a:t>VS Code)</a:t>
             </a:r>
             <a:endParaRPr lang="en-US" dirty="0"/>
           </a:p>
@@ -52135,7 +52228,19 @@
             </a:r>
             <a:r>
               <a:rPr lang="en-US" dirty="0"/>
-              <a:t> markup yang </a:t>
+              <a:t> </a:t>
+            </a:r>
+            <a:r>
+              <a:rPr lang="en-US" b="1" i="1" dirty="0" smtClean="0"/>
+              <a:t>Markup</a:t>
+            </a:r>
+            <a:r>
+              <a:rPr lang="en-US" b="1" dirty="0" smtClean="0"/>
+              <a:t> </a:t>
+            </a:r>
+            <a:r>
+              <a:rPr lang="en-US" dirty="0"/>
+              <a:t>yang </a:t>
             </a:r>
             <a:r>
               <a:rPr lang="en-US" dirty="0" err="1"/>
@@ -53435,6 +53540,15 @@
 </file>
 
 <file path=customXml/item1.xml><?xml version="1.0" encoding="utf-8"?>
+<?mso-contentType ?>
+<FormTemplates xmlns="http://schemas.microsoft.com/sharepoint/v3/contenttype/forms">
+  <Display>DocumentLibraryForm</Display>
+  <Edit>DocumentLibraryForm</Edit>
+  <New>DocumentLibraryForm</New>
+</FormTemplates>
+</file>
+
+<file path=customXml/item2.xml><?xml version="1.0" encoding="utf-8"?>
 <ct:contentTypeSchema xmlns:ct="http://schemas.microsoft.com/office/2006/metadata/contentType" xmlns:ma="http://schemas.microsoft.com/office/2006/metadata/properties/metaAttributes" ct:_="" ma:_="" ma:contentTypeName="Document" ma:contentTypeID="0x01010079F111ED35F8CC479449609E8A0923A6" ma:contentTypeVersion="11" ma:contentTypeDescription="Create a new document." ma:contentTypeScope="" ma:versionID="96291512c1ee715ab617f4c07df79fc1">
   <xsd:schema xmlns:xsd="http://www.w3.org/2001/XMLSchema" xmlns:xs="http://www.w3.org/2001/XMLSchema" xmlns:p="http://schemas.microsoft.com/office/2006/metadata/properties" xmlns:ns2="71af3243-3dd4-4a8d-8c0d-dd76da1f02a5" xmlns:ns3="16c05727-aa75-4e4a-9b5f-8a80a1165891" targetNamespace="http://schemas.microsoft.com/office/2006/metadata/properties" ma:root="true" ma:fieldsID="8256c27c40ca5c40ce1cf6c44f0205df" ns2:_="" ns3:_="">
     <xsd:import namespace="71af3243-3dd4-4a8d-8c0d-dd76da1f02a5"/>
@@ -53645,15 +53759,6 @@
 </ct:contentTypeSchema>
 </file>
 
-<file path=customXml/item2.xml><?xml version="1.0" encoding="utf-8"?>
-<?mso-contentType ?>
-<FormTemplates xmlns="http://schemas.microsoft.com/sharepoint/v3/contenttype/forms">
-  <Display>DocumentLibraryForm</Display>
-  <Edit>DocumentLibraryForm</Edit>
-  <New>DocumentLibraryForm</New>
-</FormTemplates>
-</file>
-
 <file path=customXml/item3.xml><?xml version="1.0" encoding="utf-8"?>
 <p:properties xmlns:p="http://schemas.microsoft.com/office/2006/metadata/properties" xmlns:xsi="http://www.w3.org/2001/XMLSchema-instance" xmlns:pc="http://schemas.microsoft.com/office/infopath/2007/PartnerControls">
   <documentManagement>
@@ -53663,6 +53768,14 @@
 </file>
 
 <file path=customXml/itemProps1.xml><?xml version="1.0" encoding="utf-8"?>
+<ds:datastoreItem xmlns:ds="http://schemas.openxmlformats.org/officeDocument/2006/customXml" ds:itemID="{A80A5AF1-8C57-4290-936E-5FD27C957251}">
+  <ds:schemaRefs>
+    <ds:schemaRef ds:uri="http://schemas.microsoft.com/sharepoint/v3/contenttype/forms"/>
+  </ds:schemaRefs>
+</ds:datastoreItem>
+</file>
+
+<file path=customXml/itemProps2.xml><?xml version="1.0" encoding="utf-8"?>
 <ds:datastoreItem xmlns:ds="http://schemas.openxmlformats.org/officeDocument/2006/customXml" ds:itemID="{8F8919DE-9BD9-47A9-9F5D-16EBB9687974}">
   <ds:schemaRefs>
     <ds:schemaRef ds:uri="http://schemas.microsoft.com/office/2006/metadata/contentType"/>
@@ -53677,14 +53790,6 @@
     <ds:schemaRef ds:uri="http://purl.org/dc/elements/1.1/"/>
     <ds:schemaRef ds:uri="http://purl.org/dc/terms/"/>
     <ds:schemaRef ds:uri="http://schemas.microsoft.com/internal/obd"/>
-  </ds:schemaRefs>
-</ds:datastoreItem>
-</file>
-
-<file path=customXml/itemProps2.xml><?xml version="1.0" encoding="utf-8"?>
-<ds:datastoreItem xmlns:ds="http://schemas.openxmlformats.org/officeDocument/2006/customXml" ds:itemID="{A80A5AF1-8C57-4290-936E-5FD27C957251}">
-  <ds:schemaRefs>
-    <ds:schemaRef ds:uri="http://schemas.microsoft.com/sharepoint/v3/contenttype/forms"/>
   </ds:schemaRefs>
 </ds:datastoreItem>
 </file>

</xml_diff>